<commit_message>
Update Assembly slides on data representations
</commit_message>
<xml_diff>
--- a/courses/24S/Assembly/notes/06_x865_data.pptx
+++ b/courses/24S/Assembly/notes/06_x865_data.pptx
@@ -12833,7 +12833,7 @@
 </file>
 
 <file path=ppt/slides/slide19.xml><?xml version="1.0" encoding="utf-8"?>
-<p:sld xmlns:a="http://schemas.openxmlformats.org/drawingml/2006/main" xmlns:r="http://schemas.openxmlformats.org/officeDocument/2006/relationships" xmlns:p="http://schemas.openxmlformats.org/presentationml/2006/main" show="0">
+<p:sld xmlns:a="http://schemas.openxmlformats.org/drawingml/2006/main" xmlns:r="http://schemas.openxmlformats.org/officeDocument/2006/relationships" xmlns:p="http://schemas.openxmlformats.org/presentationml/2006/main">
   <p:cSld>
     <p:spTree>
       <p:nvGrpSpPr>
@@ -13076,7 +13076,7 @@
         </p:nvSpPr>
         <p:spPr>
           <a:xfrm>
-            <a:off x="381000" y="1130300"/>
+            <a:off x="279400" y="1140205"/>
             <a:ext cx="7143328" cy="3187700"/>
           </a:xfrm>
           <a:ln/>
@@ -13180,9 +13180,993 @@
           </a:p>
         </p:txBody>
       </p:sp>
+      <p:grpSp>
+        <p:nvGrpSpPr>
+          <p:cNvPr id="2" name="Group 1">
+            <a:extLst>
+              <a:ext uri="{FF2B5EF4-FFF2-40B4-BE49-F238E27FC236}">
+                <a16:creationId xmlns:a16="http://schemas.microsoft.com/office/drawing/2014/main" id="{E4729983-773B-FB73-232B-00E10E9F580B}"/>
+              </a:ext>
+            </a:extLst>
+          </p:cNvPr>
+          <p:cNvGrpSpPr/>
+          <p:nvPr/>
+        </p:nvGrpSpPr>
+        <p:grpSpPr>
+          <a:xfrm>
+            <a:off x="9393" y="4471084"/>
+            <a:ext cx="8995264" cy="1706407"/>
+            <a:chOff x="-1373039" y="4495004"/>
+            <a:chExt cx="10779150" cy="1943102"/>
+          </a:xfrm>
+        </p:grpSpPr>
+        <p:sp>
+          <p:nvSpPr>
+            <p:cNvPr id="25607" name="Rectangle 7"/>
+            <p:cNvSpPr>
+              <a:spLocks/>
+            </p:cNvSpPr>
+            <p:nvPr/>
+          </p:nvSpPr>
+          <p:spPr bwMode="auto">
+            <a:xfrm>
+              <a:off x="-1120626" y="4495006"/>
+              <a:ext cx="317500" cy="381000"/>
+            </a:xfrm>
+            <a:prstGeom prst="rect">
+              <a:avLst/>
+            </a:prstGeom>
+            <a:solidFill>
+              <a:srgbClr val="F6F5BD"/>
+            </a:solidFill>
+            <a:ln w="25400" cap="flat">
+              <a:solidFill>
+                <a:schemeClr val="tx1"/>
+              </a:solidFill>
+              <a:prstDash val="solid"/>
+              <a:miter lim="800000"/>
+              <a:headEnd type="none" w="med" len="med"/>
+              <a:tailEnd type="none" w="med" len="med"/>
+            </a:ln>
+          </p:spPr>
+          <p:txBody>
+            <a:bodyPr lIns="38100" tIns="38100" rIns="38100" bIns="38100" anchor="ctr"/>
+            <a:lstStyle/>
+            <a:p>
+              <a:pPr algn="ctr"/>
+              <a:r>
+                <a:rPr lang="en-US" sz="2000" dirty="0">
+                  <a:solidFill>
+                    <a:schemeClr val="tx1"/>
+                  </a:solidFill>
+                  <a:latin typeface="Courier New" pitchFamily="49" charset="0"/>
+                  <a:cs typeface="Courier New" pitchFamily="49" charset="0"/>
+                  <a:sym typeface="Courier New Bold" charset="0"/>
+                </a:rPr>
+                <a:t>c</a:t>
+              </a:r>
+            </a:p>
+          </p:txBody>
+        </p:sp>
+        <p:sp>
+          <p:nvSpPr>
+            <p:cNvPr id="25608" name="Rectangle 8"/>
+            <p:cNvSpPr>
+              <a:spLocks/>
+            </p:cNvSpPr>
+            <p:nvPr/>
+          </p:nvSpPr>
+          <p:spPr bwMode="auto">
+            <a:xfrm>
+              <a:off x="149374" y="4495006"/>
+              <a:ext cx="1270000" cy="381000"/>
+            </a:xfrm>
+            <a:prstGeom prst="rect">
+              <a:avLst/>
+            </a:prstGeom>
+            <a:solidFill>
+              <a:srgbClr val="D5F1CF"/>
+            </a:solidFill>
+            <a:ln w="25400" cap="flat">
+              <a:solidFill>
+                <a:schemeClr val="tx1"/>
+              </a:solidFill>
+              <a:prstDash val="solid"/>
+              <a:miter lim="800000"/>
+              <a:headEnd type="none" w="med" len="med"/>
+              <a:tailEnd type="none" w="med" len="med"/>
+            </a:ln>
+          </p:spPr>
+          <p:txBody>
+            <a:bodyPr lIns="38100" tIns="38100" rIns="38100" bIns="38100" anchor="ctr"/>
+            <a:lstStyle/>
+            <a:p>
+              <a:pPr algn="ctr"/>
+              <a:r>
+                <a:rPr lang="en-US" sz="2000">
+                  <a:solidFill>
+                    <a:schemeClr val="tx1"/>
+                  </a:solidFill>
+                  <a:latin typeface="Courier New" pitchFamily="49" charset="0"/>
+                  <a:cs typeface="Courier New" pitchFamily="49" charset="0"/>
+                  <a:sym typeface="Courier New Bold" charset="0"/>
+                </a:rPr>
+                <a:t>i[0]</a:t>
+              </a:r>
+            </a:p>
+          </p:txBody>
+        </p:sp>
+        <p:sp>
+          <p:nvSpPr>
+            <p:cNvPr id="25609" name="Rectangle 9"/>
+            <p:cNvSpPr>
+              <a:spLocks/>
+            </p:cNvSpPr>
+            <p:nvPr/>
+          </p:nvSpPr>
+          <p:spPr bwMode="auto">
+            <a:xfrm>
+              <a:off x="1419374" y="4495006"/>
+              <a:ext cx="1270000" cy="381000"/>
+            </a:xfrm>
+            <a:prstGeom prst="rect">
+              <a:avLst/>
+            </a:prstGeom>
+            <a:solidFill>
+              <a:srgbClr val="D5F1CF"/>
+            </a:solidFill>
+            <a:ln w="25400" cap="flat">
+              <a:solidFill>
+                <a:schemeClr val="tx1"/>
+              </a:solidFill>
+              <a:prstDash val="solid"/>
+              <a:miter lim="800000"/>
+              <a:headEnd type="none" w="med" len="med"/>
+              <a:tailEnd type="none" w="med" len="med"/>
+            </a:ln>
+          </p:spPr>
+          <p:txBody>
+            <a:bodyPr lIns="38100" tIns="38100" rIns="38100" bIns="38100" anchor="ctr"/>
+            <a:lstStyle/>
+            <a:p>
+              <a:pPr algn="ctr"/>
+              <a:r>
+                <a:rPr lang="en-US" sz="2000">
+                  <a:solidFill>
+                    <a:schemeClr val="tx1"/>
+                  </a:solidFill>
+                  <a:latin typeface="Courier New" pitchFamily="49" charset="0"/>
+                  <a:cs typeface="Courier New" pitchFamily="49" charset="0"/>
+                  <a:sym typeface="Courier New Bold" charset="0"/>
+                </a:rPr>
+                <a:t>i[1]</a:t>
+              </a:r>
+            </a:p>
+          </p:txBody>
+        </p:sp>
+        <p:sp>
+          <p:nvSpPr>
+            <p:cNvPr id="25610" name="Rectangle 10"/>
+            <p:cNvSpPr>
+              <a:spLocks/>
+            </p:cNvSpPr>
+            <p:nvPr/>
+          </p:nvSpPr>
+          <p:spPr bwMode="auto">
+            <a:xfrm>
+              <a:off x="3959374" y="4495006"/>
+              <a:ext cx="2540000" cy="381000"/>
+            </a:xfrm>
+            <a:prstGeom prst="rect">
+              <a:avLst/>
+            </a:prstGeom>
+            <a:solidFill>
+              <a:srgbClr val="D6D6F4"/>
+            </a:solidFill>
+            <a:ln w="25400" cap="flat">
+              <a:solidFill>
+                <a:schemeClr val="tx1"/>
+              </a:solidFill>
+              <a:prstDash val="solid"/>
+              <a:miter lim="800000"/>
+              <a:headEnd type="none" w="med" len="med"/>
+              <a:tailEnd type="none" w="med" len="med"/>
+            </a:ln>
+          </p:spPr>
+          <p:txBody>
+            <a:bodyPr lIns="38100" tIns="38100" rIns="38100" bIns="38100" anchor="ctr"/>
+            <a:lstStyle/>
+            <a:p>
+              <a:pPr algn="ctr"/>
+              <a:r>
+                <a:rPr lang="en-US" sz="2000" dirty="0">
+                  <a:solidFill>
+                    <a:schemeClr val="tx1"/>
+                  </a:solidFill>
+                  <a:latin typeface="Courier New" pitchFamily="49" charset="0"/>
+                  <a:cs typeface="Courier New" pitchFamily="49" charset="0"/>
+                  <a:sym typeface="Courier New Bold" charset="0"/>
+                </a:rPr>
+                <a:t>v</a:t>
+              </a:r>
+            </a:p>
+          </p:txBody>
+        </p:sp>
+        <p:sp>
+          <p:nvSpPr>
+            <p:cNvPr id="25611" name="Rectangle 11"/>
+            <p:cNvSpPr>
+              <a:spLocks/>
+            </p:cNvSpPr>
+            <p:nvPr/>
+          </p:nvSpPr>
+          <p:spPr bwMode="auto">
+            <a:xfrm>
+              <a:off x="-803126" y="4495006"/>
+              <a:ext cx="952500" cy="381000"/>
+            </a:xfrm>
+            <a:prstGeom prst="rect">
+              <a:avLst/>
+            </a:prstGeom>
+            <a:solidFill>
+              <a:srgbClr val="B2B2B2"/>
+            </a:solidFill>
+            <a:ln w="25400" cap="flat">
+              <a:solidFill>
+                <a:schemeClr val="tx1"/>
+              </a:solidFill>
+              <a:prstDash val="solid"/>
+              <a:miter lim="800000"/>
+              <a:headEnd type="none" w="med" len="med"/>
+              <a:tailEnd type="none" w="med" len="med"/>
+            </a:ln>
+          </p:spPr>
+          <p:txBody>
+            <a:bodyPr lIns="38100" tIns="38100" rIns="38100" bIns="38100" anchor="ctr"/>
+            <a:lstStyle/>
+            <a:p>
+              <a:pPr algn="ctr"/>
+              <a:r>
+                <a:rPr lang="en-US" sz="1600" dirty="0">
+                  <a:solidFill>
+                    <a:srgbClr val="FFFFFF"/>
+                  </a:solidFill>
+                  <a:latin typeface="Calibri Bold Italic" charset="0"/>
+                  <a:ea typeface="Calibri Bold Italic" charset="0"/>
+                  <a:cs typeface="Calibri Bold Italic" charset="0"/>
+                  <a:sym typeface="Calibri Bold Italic" charset="0"/>
+                </a:rPr>
+                <a:t>3 bytes</a:t>
+              </a:r>
+            </a:p>
+          </p:txBody>
+        </p:sp>
+        <p:sp>
+          <p:nvSpPr>
+            <p:cNvPr id="25612" name="Rectangle 12"/>
+            <p:cNvSpPr>
+              <a:spLocks/>
+            </p:cNvSpPr>
+            <p:nvPr/>
+          </p:nvSpPr>
+          <p:spPr bwMode="auto">
+            <a:xfrm>
+              <a:off x="2689374" y="4495006"/>
+              <a:ext cx="1270000" cy="381000"/>
+            </a:xfrm>
+            <a:prstGeom prst="rect">
+              <a:avLst/>
+            </a:prstGeom>
+            <a:solidFill>
+              <a:srgbClr val="B2B2B2"/>
+            </a:solidFill>
+            <a:ln w="25400" cap="flat">
+              <a:solidFill>
+                <a:schemeClr val="tx1"/>
+              </a:solidFill>
+              <a:prstDash val="solid"/>
+              <a:miter lim="800000"/>
+              <a:headEnd type="none" w="med" len="med"/>
+              <a:tailEnd type="none" w="med" len="med"/>
+            </a:ln>
+          </p:spPr>
+          <p:txBody>
+            <a:bodyPr lIns="38100" tIns="38100" rIns="38100" bIns="38100" anchor="ctr"/>
+            <a:lstStyle/>
+            <a:p>
+              <a:pPr algn="ctr"/>
+              <a:r>
+                <a:rPr lang="en-US" sz="1600" dirty="0">
+                  <a:solidFill>
+                    <a:srgbClr val="FFFFFF"/>
+                  </a:solidFill>
+                  <a:latin typeface="Calibri Bold Italic" charset="0"/>
+                  <a:ea typeface="Calibri Bold Italic" charset="0"/>
+                  <a:cs typeface="Calibri Bold Italic" charset="0"/>
+                  <a:sym typeface="Calibri Bold Italic" charset="0"/>
+                </a:rPr>
+                <a:t>4 bytes</a:t>
+              </a:r>
+            </a:p>
+          </p:txBody>
+        </p:sp>
+        <p:sp>
+          <p:nvSpPr>
+            <p:cNvPr id="25613" name="Rectangle 13"/>
+            <p:cNvSpPr>
+              <a:spLocks/>
+            </p:cNvSpPr>
+            <p:nvPr/>
+          </p:nvSpPr>
+          <p:spPr bwMode="auto">
+            <a:xfrm>
+              <a:off x="-1373039" y="4888706"/>
+              <a:ext cx="609320" cy="403038"/>
+            </a:xfrm>
+            <a:prstGeom prst="rect">
+              <a:avLst/>
+            </a:prstGeom>
+            <a:noFill/>
+            <a:ln w="25400" cap="flat">
+              <a:noFill/>
+              <a:miter lim="800000"/>
+              <a:headEnd type="none" w="med" len="med"/>
+              <a:tailEnd type="none" w="med" len="med"/>
+            </a:ln>
+          </p:spPr>
+          <p:txBody>
+            <a:bodyPr wrap="square" lIns="38100" tIns="38100" rIns="38100" bIns="38100">
+              <a:spAutoFit/>
+            </a:bodyPr>
+            <a:lstStyle/>
+            <a:p>
+              <a:r>
+                <a:rPr lang="en-US" sz="1800" dirty="0">
+                  <a:solidFill>
+                    <a:schemeClr val="tx1"/>
+                  </a:solidFill>
+                  <a:latin typeface="Courier New" pitchFamily="49" charset="0"/>
+                  <a:cs typeface="Courier New" pitchFamily="49" charset="0"/>
+                  <a:sym typeface="Courier New Bold" charset="0"/>
+                </a:rPr>
+                <a:t>p+0</a:t>
+              </a:r>
+            </a:p>
+          </p:txBody>
+        </p:sp>
+        <p:sp>
+          <p:nvSpPr>
+            <p:cNvPr id="25614" name="Rectangle 14"/>
+            <p:cNvSpPr>
+              <a:spLocks/>
+            </p:cNvSpPr>
+            <p:nvPr/>
+          </p:nvSpPr>
+          <p:spPr bwMode="auto">
+            <a:xfrm>
+              <a:off x="-101451" y="4888706"/>
+              <a:ext cx="609320" cy="403038"/>
+            </a:xfrm>
+            <a:prstGeom prst="rect">
+              <a:avLst/>
+            </a:prstGeom>
+            <a:noFill/>
+            <a:ln w="25400" cap="flat">
+              <a:noFill/>
+              <a:miter lim="800000"/>
+              <a:headEnd type="none" w="med" len="med"/>
+              <a:tailEnd type="none" w="med" len="med"/>
+            </a:ln>
+          </p:spPr>
+          <p:txBody>
+            <a:bodyPr wrap="square" lIns="38100" tIns="38100" rIns="38100" bIns="38100">
+              <a:spAutoFit/>
+            </a:bodyPr>
+            <a:lstStyle/>
+            <a:p>
+              <a:r>
+                <a:rPr lang="en-US" sz="1800" dirty="0">
+                  <a:solidFill>
+                    <a:schemeClr val="tx1"/>
+                  </a:solidFill>
+                  <a:latin typeface="Courier New" pitchFamily="49" charset="0"/>
+                  <a:cs typeface="Courier New" pitchFamily="49" charset="0"/>
+                  <a:sym typeface="Courier New Bold" charset="0"/>
+                </a:rPr>
+                <a:t>p+4</a:t>
+              </a:r>
+            </a:p>
+          </p:txBody>
+        </p:sp>
+        <p:sp>
+          <p:nvSpPr>
+            <p:cNvPr id="25615" name="Rectangle 15"/>
+            <p:cNvSpPr>
+              <a:spLocks/>
+            </p:cNvSpPr>
+            <p:nvPr/>
+          </p:nvSpPr>
+          <p:spPr bwMode="auto">
+            <a:xfrm>
+              <a:off x="1154261" y="4888706"/>
+              <a:ext cx="661707" cy="403038"/>
+            </a:xfrm>
+            <a:prstGeom prst="rect">
+              <a:avLst/>
+            </a:prstGeom>
+            <a:noFill/>
+            <a:ln w="25400" cap="flat">
+              <a:noFill/>
+              <a:miter lim="800000"/>
+              <a:headEnd type="none" w="med" len="med"/>
+              <a:tailEnd type="none" w="med" len="med"/>
+            </a:ln>
+          </p:spPr>
+          <p:txBody>
+            <a:bodyPr wrap="square" lIns="38100" tIns="38100" rIns="38100" bIns="38100">
+              <a:spAutoFit/>
+            </a:bodyPr>
+            <a:lstStyle/>
+            <a:p>
+              <a:r>
+                <a:rPr lang="en-US" sz="1800" dirty="0">
+                  <a:solidFill>
+                    <a:schemeClr val="tx1"/>
+                  </a:solidFill>
+                  <a:latin typeface="Courier New" pitchFamily="49" charset="0"/>
+                  <a:cs typeface="Courier New" pitchFamily="49" charset="0"/>
+                  <a:sym typeface="Courier New Bold" charset="0"/>
+                </a:rPr>
+                <a:t>p+8</a:t>
+              </a:r>
+            </a:p>
+          </p:txBody>
+        </p:sp>
+        <p:sp>
+          <p:nvSpPr>
+            <p:cNvPr id="25616" name="Rectangle 16"/>
+            <p:cNvSpPr>
+              <a:spLocks/>
+            </p:cNvSpPr>
+            <p:nvPr/>
+          </p:nvSpPr>
+          <p:spPr bwMode="auto">
+            <a:xfrm>
+              <a:off x="3633935" y="4888706"/>
+              <a:ext cx="879758" cy="403038"/>
+            </a:xfrm>
+            <a:prstGeom prst="rect">
+              <a:avLst/>
+            </a:prstGeom>
+            <a:noFill/>
+            <a:ln w="25400" cap="flat">
+              <a:noFill/>
+              <a:miter lim="800000"/>
+              <a:headEnd type="none" w="med" len="med"/>
+              <a:tailEnd type="none" w="med" len="med"/>
+            </a:ln>
+          </p:spPr>
+          <p:txBody>
+            <a:bodyPr wrap="square" lIns="38100" tIns="38100" rIns="38100" bIns="38100">
+              <a:spAutoFit/>
+            </a:bodyPr>
+            <a:lstStyle/>
+            <a:p>
+              <a:r>
+                <a:rPr lang="en-US" sz="1800" dirty="0">
+                  <a:solidFill>
+                    <a:schemeClr val="tx1"/>
+                  </a:solidFill>
+                  <a:latin typeface="Courier New" pitchFamily="49" charset="0"/>
+                  <a:cs typeface="Courier New" pitchFamily="49" charset="0"/>
+                  <a:sym typeface="Courier New Bold" charset="0"/>
+                </a:rPr>
+                <a:t>p+16</a:t>
+              </a:r>
+            </a:p>
+          </p:txBody>
+        </p:sp>
+        <p:sp>
+          <p:nvSpPr>
+            <p:cNvPr id="25617" name="Rectangle 17"/>
+            <p:cNvSpPr>
+              <a:spLocks/>
+            </p:cNvSpPr>
+            <p:nvPr/>
+          </p:nvSpPr>
+          <p:spPr bwMode="auto">
+            <a:xfrm>
+              <a:off x="6180285" y="4888706"/>
+              <a:ext cx="854226" cy="403038"/>
+            </a:xfrm>
+            <a:prstGeom prst="rect">
+              <a:avLst/>
+            </a:prstGeom>
+            <a:noFill/>
+            <a:ln w="25400" cap="flat">
+              <a:noFill/>
+              <a:miter lim="800000"/>
+              <a:headEnd type="none" w="med" len="med"/>
+              <a:tailEnd type="none" w="med" len="med"/>
+            </a:ln>
+          </p:spPr>
+          <p:txBody>
+            <a:bodyPr wrap="square" lIns="38100" tIns="38100" rIns="38100" bIns="38100">
+              <a:spAutoFit/>
+            </a:bodyPr>
+            <a:lstStyle/>
+            <a:p>
+              <a:r>
+                <a:rPr lang="en-US" sz="1800" dirty="0">
+                  <a:solidFill>
+                    <a:schemeClr val="tx1"/>
+                  </a:solidFill>
+                  <a:latin typeface="Courier New" pitchFamily="49" charset="0"/>
+                  <a:cs typeface="Courier New" pitchFamily="49" charset="0"/>
+                  <a:sym typeface="Courier New Bold" charset="0"/>
+                </a:rPr>
+                <a:t>p+24</a:t>
+              </a:r>
+            </a:p>
+          </p:txBody>
+        </p:sp>
+        <p:sp>
+          <p:nvSpPr>
+            <p:cNvPr id="25618" name="Line 18"/>
+            <p:cNvSpPr>
+              <a:spLocks noChangeShapeType="1"/>
+            </p:cNvSpPr>
+            <p:nvPr/>
+          </p:nvSpPr>
+          <p:spPr bwMode="auto">
+            <a:xfrm rot="10800000" flipH="1">
+              <a:off x="149374" y="5237956"/>
+              <a:ext cx="0" cy="381000"/>
+            </a:xfrm>
+            <a:prstGeom prst="line">
+              <a:avLst/>
+            </a:prstGeom>
+            <a:noFill/>
+            <a:ln w="25400" cap="flat">
+              <a:solidFill>
+                <a:schemeClr val="tx1"/>
+              </a:solidFill>
+              <a:prstDash val="solid"/>
+              <a:round/>
+              <a:headEnd type="none" w="med" len="med"/>
+              <a:tailEnd type="triangle" w="med" len="med"/>
+            </a:ln>
+          </p:spPr>
+          <p:txBody>
+            <a:bodyPr lIns="0" tIns="0" rIns="0" bIns="0"/>
+            <a:lstStyle/>
+            <a:p>
+              <a:endParaRPr lang="en-US"/>
+            </a:p>
+          </p:txBody>
+        </p:sp>
+        <p:sp>
+          <p:nvSpPr>
+            <p:cNvPr id="25619" name="Rectangle 19"/>
+            <p:cNvSpPr>
+              <a:spLocks/>
+            </p:cNvSpPr>
+            <p:nvPr/>
+          </p:nvSpPr>
+          <p:spPr bwMode="auto">
+            <a:xfrm>
+              <a:off x="-371326" y="5571331"/>
+              <a:ext cx="2070100" cy="355600"/>
+            </a:xfrm>
+            <a:prstGeom prst="rect">
+              <a:avLst/>
+            </a:prstGeom>
+            <a:noFill/>
+            <a:ln w="12700" cap="flat">
+              <a:noFill/>
+              <a:miter lim="800000"/>
+              <a:headEnd type="none" w="med" len="med"/>
+              <a:tailEnd type="none" w="med" len="med"/>
+            </a:ln>
+          </p:spPr>
+          <p:txBody>
+            <a:bodyPr lIns="38100" tIns="38100" rIns="38100" bIns="38100"/>
+            <a:lstStyle/>
+            <a:p>
+              <a:pPr marL="185738" indent="-185738">
+                <a:spcBef>
+                  <a:spcPts val="638"/>
+                </a:spcBef>
+              </a:pPr>
+              <a:r>
+                <a:rPr lang="en-US" sz="1800">
+                  <a:solidFill>
+                    <a:schemeClr val="tx1"/>
+                  </a:solidFill>
+                  <a:latin typeface="Calibri Bold" charset="0"/>
+                  <a:ea typeface="Calibri Bold" charset="0"/>
+                  <a:cs typeface="Calibri Bold" charset="0"/>
+                  <a:sym typeface="Calibri Bold" charset="0"/>
+                </a:rPr>
+                <a:t>Multiple of 4</a:t>
+              </a:r>
+            </a:p>
+          </p:txBody>
+        </p:sp>
+        <p:sp>
+          <p:nvSpPr>
+            <p:cNvPr id="25620" name="Rectangle 20"/>
+            <p:cNvSpPr>
+              <a:spLocks/>
+            </p:cNvSpPr>
+            <p:nvPr/>
+          </p:nvSpPr>
+          <p:spPr bwMode="auto">
+            <a:xfrm>
+              <a:off x="3044974" y="5571331"/>
+              <a:ext cx="1905000" cy="355600"/>
+            </a:xfrm>
+            <a:prstGeom prst="rect">
+              <a:avLst/>
+            </a:prstGeom>
+            <a:noFill/>
+            <a:ln w="12700" cap="flat">
+              <a:noFill/>
+              <a:miter lim="800000"/>
+              <a:headEnd type="none" w="med" len="med"/>
+              <a:tailEnd type="none" w="med" len="med"/>
+            </a:ln>
+          </p:spPr>
+          <p:txBody>
+            <a:bodyPr lIns="38100" tIns="38100" rIns="38100" bIns="38100"/>
+            <a:lstStyle/>
+            <a:p>
+              <a:pPr marL="185738" indent="-185738">
+                <a:spcBef>
+                  <a:spcPts val="638"/>
+                </a:spcBef>
+              </a:pPr>
+              <a:r>
+                <a:rPr lang="en-US" sz="1800" dirty="0">
+                  <a:solidFill>
+                    <a:schemeClr val="tx1"/>
+                  </a:solidFill>
+                  <a:latin typeface="Calibri Bold" charset="0"/>
+                  <a:ea typeface="Calibri Bold" charset="0"/>
+                  <a:cs typeface="Calibri Bold" charset="0"/>
+                  <a:sym typeface="Calibri Bold" charset="0"/>
+                </a:rPr>
+                <a:t>Multiple of 8</a:t>
+              </a:r>
+            </a:p>
+          </p:txBody>
+        </p:sp>
+        <p:sp>
+          <p:nvSpPr>
+            <p:cNvPr id="25621" name="Line 21"/>
+            <p:cNvSpPr>
+              <a:spLocks noChangeShapeType="1"/>
+            </p:cNvSpPr>
+            <p:nvPr/>
+          </p:nvSpPr>
+          <p:spPr bwMode="auto">
+            <a:xfrm rot="10800000" flipH="1">
+              <a:off x="3959374" y="5237956"/>
+              <a:ext cx="0" cy="381000"/>
+            </a:xfrm>
+            <a:prstGeom prst="line">
+              <a:avLst/>
+            </a:prstGeom>
+            <a:noFill/>
+            <a:ln w="25400" cap="flat">
+              <a:solidFill>
+                <a:schemeClr val="tx1"/>
+              </a:solidFill>
+              <a:prstDash val="solid"/>
+              <a:round/>
+              <a:headEnd type="none" w="med" len="med"/>
+              <a:tailEnd type="triangle" w="med" len="med"/>
+            </a:ln>
+          </p:spPr>
+          <p:txBody>
+            <a:bodyPr lIns="0" tIns="0" rIns="0" bIns="0"/>
+            <a:lstStyle/>
+            <a:p>
+              <a:endParaRPr lang="en-US"/>
+            </a:p>
+          </p:txBody>
+        </p:sp>
+        <p:sp>
+          <p:nvSpPr>
+            <p:cNvPr id="25622" name="Rectangle 22"/>
+            <p:cNvSpPr>
+              <a:spLocks/>
+            </p:cNvSpPr>
+            <p:nvPr/>
+          </p:nvSpPr>
+          <p:spPr bwMode="auto">
+            <a:xfrm>
+              <a:off x="-1349226" y="6082506"/>
+              <a:ext cx="1646935" cy="355600"/>
+            </a:xfrm>
+            <a:prstGeom prst="rect">
+              <a:avLst/>
+            </a:prstGeom>
+            <a:noFill/>
+            <a:ln w="12700" cap="flat">
+              <a:noFill/>
+              <a:miter lim="800000"/>
+              <a:headEnd type="none" w="med" len="med"/>
+              <a:tailEnd type="none" w="med" len="med"/>
+            </a:ln>
+          </p:spPr>
+          <p:txBody>
+            <a:bodyPr lIns="38100" tIns="38100" rIns="38100" bIns="38100"/>
+            <a:lstStyle/>
+            <a:p>
+              <a:pPr marL="185738" indent="-185738">
+                <a:spcBef>
+                  <a:spcPts val="638"/>
+                </a:spcBef>
+              </a:pPr>
+              <a:r>
+                <a:rPr lang="en-US" sz="1800" dirty="0">
+                  <a:solidFill>
+                    <a:schemeClr val="tx1"/>
+                  </a:solidFill>
+                  <a:latin typeface="Calibri Bold" charset="0"/>
+                  <a:ea typeface="Calibri Bold" charset="0"/>
+                  <a:cs typeface="Calibri Bold" charset="0"/>
+                  <a:sym typeface="Calibri Bold" charset="0"/>
+                </a:rPr>
+                <a:t>Multiple of 8</a:t>
+              </a:r>
+            </a:p>
+          </p:txBody>
+        </p:sp>
+        <p:sp>
+          <p:nvSpPr>
+            <p:cNvPr id="25623" name="Line 23"/>
+            <p:cNvSpPr>
+              <a:spLocks noChangeShapeType="1"/>
+            </p:cNvSpPr>
+            <p:nvPr/>
+          </p:nvSpPr>
+          <p:spPr bwMode="auto">
+            <a:xfrm rot="10800000" flipH="1">
+              <a:off x="-1120626" y="5237956"/>
+              <a:ext cx="0" cy="838200"/>
+            </a:xfrm>
+            <a:prstGeom prst="line">
+              <a:avLst/>
+            </a:prstGeom>
+            <a:noFill/>
+            <a:ln w="25400" cap="flat">
+              <a:solidFill>
+                <a:schemeClr val="tx1"/>
+              </a:solidFill>
+              <a:prstDash val="solid"/>
+              <a:round/>
+              <a:headEnd type="none" w="med" len="med"/>
+              <a:tailEnd type="triangle" w="med" len="med"/>
+            </a:ln>
+          </p:spPr>
+          <p:txBody>
+            <a:bodyPr lIns="0" tIns="0" rIns="0" bIns="0"/>
+            <a:lstStyle/>
+            <a:p>
+              <a:endParaRPr lang="en-US"/>
+            </a:p>
+          </p:txBody>
+        </p:sp>
+        <p:sp>
+          <p:nvSpPr>
+            <p:cNvPr id="25624" name="Rectangle 24"/>
+            <p:cNvSpPr>
+              <a:spLocks/>
+            </p:cNvSpPr>
+            <p:nvPr/>
+          </p:nvSpPr>
+          <p:spPr bwMode="auto">
+            <a:xfrm>
+              <a:off x="5191274" y="6082506"/>
+              <a:ext cx="1646931" cy="355600"/>
+            </a:xfrm>
+            <a:prstGeom prst="rect">
+              <a:avLst/>
+            </a:prstGeom>
+            <a:noFill/>
+            <a:ln w="12700" cap="flat">
+              <a:noFill/>
+              <a:miter lim="800000"/>
+              <a:headEnd type="none" w="med" len="med"/>
+              <a:tailEnd type="none" w="med" len="med"/>
+            </a:ln>
+          </p:spPr>
+          <p:txBody>
+            <a:bodyPr lIns="38100" tIns="38100" rIns="38100" bIns="38100"/>
+            <a:lstStyle/>
+            <a:p>
+              <a:pPr marL="185738" indent="-185738">
+                <a:spcBef>
+                  <a:spcPts val="638"/>
+                </a:spcBef>
+              </a:pPr>
+              <a:r>
+                <a:rPr lang="en-US" sz="1800" dirty="0">
+                  <a:solidFill>
+                    <a:schemeClr val="tx1"/>
+                  </a:solidFill>
+                  <a:latin typeface="Calibri Bold" charset="0"/>
+                  <a:ea typeface="Calibri Bold" charset="0"/>
+                  <a:cs typeface="Calibri Bold" charset="0"/>
+                  <a:sym typeface="Calibri Bold" charset="0"/>
+                </a:rPr>
+                <a:t>Multiple of 8</a:t>
+              </a:r>
+            </a:p>
+          </p:txBody>
+        </p:sp>
+        <p:sp>
+          <p:nvSpPr>
+            <p:cNvPr id="25625" name="Line 25"/>
+            <p:cNvSpPr>
+              <a:spLocks noChangeShapeType="1"/>
+            </p:cNvSpPr>
+            <p:nvPr/>
+          </p:nvSpPr>
+          <p:spPr bwMode="auto">
+            <a:xfrm rot="10800000" flipH="1">
+              <a:off x="6499374" y="5237956"/>
+              <a:ext cx="0" cy="838200"/>
+            </a:xfrm>
+            <a:prstGeom prst="line">
+              <a:avLst/>
+            </a:prstGeom>
+            <a:noFill/>
+            <a:ln w="25400" cap="flat">
+              <a:solidFill>
+                <a:schemeClr val="tx1"/>
+              </a:solidFill>
+              <a:prstDash val="solid"/>
+              <a:round/>
+              <a:headEnd type="none" w="med" len="med"/>
+              <a:tailEnd type="triangle" w="med" len="med"/>
+            </a:ln>
+          </p:spPr>
+          <p:txBody>
+            <a:bodyPr lIns="0" tIns="0" rIns="0" bIns="0"/>
+            <a:lstStyle/>
+            <a:p>
+              <a:endParaRPr lang="en-US"/>
+            </a:p>
+          </p:txBody>
+        </p:sp>
+        <p:sp>
+          <p:nvSpPr>
+            <p:cNvPr id="24" name="Rectangle 10">
+              <a:extLst>
+                <a:ext uri="{FF2B5EF4-FFF2-40B4-BE49-F238E27FC236}">
+                  <a16:creationId xmlns:a16="http://schemas.microsoft.com/office/drawing/2014/main" id="{759DEBB7-4F33-F141-B42A-388352185244}"/>
+                </a:ext>
+              </a:extLst>
+            </p:cNvPr>
+            <p:cNvSpPr>
+              <a:spLocks/>
+            </p:cNvSpPr>
+            <p:nvPr/>
+          </p:nvSpPr>
+          <p:spPr bwMode="auto">
+            <a:xfrm>
+              <a:off x="6503143" y="4495004"/>
+              <a:ext cx="1451484" cy="381000"/>
+            </a:xfrm>
+            <a:prstGeom prst="rect">
+              <a:avLst/>
+            </a:prstGeom>
+            <a:solidFill>
+              <a:srgbClr val="D6D6F4"/>
+            </a:solidFill>
+            <a:ln w="25400" cap="flat">
+              <a:solidFill>
+                <a:schemeClr val="tx1"/>
+              </a:solidFill>
+              <a:prstDash val="solid"/>
+              <a:miter lim="800000"/>
+              <a:headEnd type="none" w="med" len="med"/>
+              <a:tailEnd type="none" w="med" len="med"/>
+            </a:ln>
+          </p:spPr>
+          <p:txBody>
+            <a:bodyPr lIns="38100" tIns="38100" rIns="38100" bIns="38100" anchor="ctr"/>
+            <a:lstStyle/>
+            <a:p>
+              <a:pPr algn="ctr"/>
+              <a:r>
+                <a:rPr lang="en-US" sz="2000" dirty="0">
+                  <a:latin typeface="Courier New" pitchFamily="49" charset="0"/>
+                  <a:cs typeface="Courier New" pitchFamily="49" charset="0"/>
+                  <a:sym typeface="Courier New Bold" charset="0"/>
+                </a:rPr>
+                <a:t>x</a:t>
+              </a:r>
+              <a:endParaRPr lang="en-US" sz="2000" dirty="0">
+                <a:solidFill>
+                  <a:schemeClr val="tx1"/>
+                </a:solidFill>
+                <a:latin typeface="Courier New" pitchFamily="49" charset="0"/>
+                <a:cs typeface="Courier New" pitchFamily="49" charset="0"/>
+                <a:sym typeface="Courier New Bold" charset="0"/>
+              </a:endParaRPr>
+            </a:p>
+          </p:txBody>
+        </p:sp>
+        <p:sp>
+          <p:nvSpPr>
+            <p:cNvPr id="25" name="Rectangle 10">
+              <a:extLst>
+                <a:ext uri="{FF2B5EF4-FFF2-40B4-BE49-F238E27FC236}">
+                  <a16:creationId xmlns:a16="http://schemas.microsoft.com/office/drawing/2014/main" id="{8AA7A0CB-B997-CF4F-BBD3-80EF7A99BC29}"/>
+                </a:ext>
+              </a:extLst>
+            </p:cNvPr>
+            <p:cNvSpPr>
+              <a:spLocks/>
+            </p:cNvSpPr>
+            <p:nvPr/>
+          </p:nvSpPr>
+          <p:spPr bwMode="auto">
+            <a:xfrm>
+              <a:off x="7954627" y="4495004"/>
+              <a:ext cx="1451484" cy="381000"/>
+            </a:xfrm>
+            <a:prstGeom prst="rect">
+              <a:avLst/>
+            </a:prstGeom>
+            <a:solidFill>
+              <a:schemeClr val="bg1">
+                <a:lumMod val="65000"/>
+              </a:schemeClr>
+            </a:solidFill>
+            <a:ln w="25400" cap="flat">
+              <a:solidFill>
+                <a:schemeClr val="tx1"/>
+              </a:solidFill>
+              <a:prstDash val="solid"/>
+              <a:miter lim="800000"/>
+              <a:headEnd type="none" w="med" len="med"/>
+              <a:tailEnd type="none" w="med" len="med"/>
+            </a:ln>
+          </p:spPr>
+          <p:txBody>
+            <a:bodyPr lIns="38100" tIns="38100" rIns="38100" bIns="38100" anchor="ctr"/>
+            <a:lstStyle/>
+            <a:p>
+              <a:pPr algn="ctr"/>
+              <a:r>
+                <a:rPr lang="en-US" sz="1600" dirty="0">
+                  <a:solidFill>
+                    <a:schemeClr val="bg1"/>
+                  </a:solidFill>
+                  <a:latin typeface="Calibri" panose="020F0502020204030204" pitchFamily="34" charset="0"/>
+                  <a:cs typeface="Calibri" panose="020F0502020204030204" pitchFamily="34" charset="0"/>
+                  <a:sym typeface="Courier New Bold" charset="0"/>
+                </a:rPr>
+                <a:t>4 bytes</a:t>
+              </a:r>
+            </a:p>
+          </p:txBody>
+        </p:sp>
+      </p:grpSp>
       <p:sp>
         <p:nvSpPr>
-          <p:cNvPr id="25607" name="Rectangle 7"/>
+          <p:cNvPr id="3" name="Rectangle 17">
+            <a:extLst>
+              <a:ext uri="{FF2B5EF4-FFF2-40B4-BE49-F238E27FC236}">
+                <a16:creationId xmlns:a16="http://schemas.microsoft.com/office/drawing/2014/main" id="{85EA0322-7DA5-DDD3-5B6C-6DE46EC92BEB}"/>
+              </a:ext>
+            </a:extLst>
+          </p:cNvPr>
           <p:cNvSpPr>
             <a:spLocks/>
           </p:cNvSpPr>
@@ -13190,298 +14174,8 @@
         </p:nvSpPr>
         <p:spPr bwMode="auto">
           <a:xfrm>
-            <a:off x="-1120626" y="4495006"/>
-            <a:ext cx="317500" cy="381000"/>
-          </a:xfrm>
-          <a:prstGeom prst="rect">
-            <a:avLst/>
-          </a:prstGeom>
-          <a:solidFill>
-            <a:srgbClr val="F6F5BD"/>
-          </a:solidFill>
-          <a:ln w="25400" cap="flat">
-            <a:solidFill>
-              <a:schemeClr val="tx1"/>
-            </a:solidFill>
-            <a:prstDash val="solid"/>
-            <a:miter lim="800000"/>
-            <a:headEnd type="none" w="med" len="med"/>
-            <a:tailEnd type="none" w="med" len="med"/>
-          </a:ln>
-        </p:spPr>
-        <p:txBody>
-          <a:bodyPr lIns="38100" tIns="38100" rIns="38100" bIns="38100" anchor="ctr"/>
-          <a:lstStyle/>
-          <a:p>
-            <a:pPr algn="ctr"/>
-            <a:r>
-              <a:rPr lang="en-US" sz="2000" dirty="0">
-                <a:solidFill>
-                  <a:schemeClr val="tx1"/>
-                </a:solidFill>
-                <a:latin typeface="Courier New" pitchFamily="49" charset="0"/>
-                <a:cs typeface="Courier New" pitchFamily="49" charset="0"/>
-                <a:sym typeface="Courier New Bold" charset="0"/>
-              </a:rPr>
-              <a:t>c</a:t>
-            </a:r>
-          </a:p>
-        </p:txBody>
-      </p:sp>
-      <p:sp>
-        <p:nvSpPr>
-          <p:cNvPr id="25608" name="Rectangle 8"/>
-          <p:cNvSpPr>
-            <a:spLocks/>
-          </p:cNvSpPr>
-          <p:nvPr/>
-        </p:nvSpPr>
-        <p:spPr bwMode="auto">
-          <a:xfrm>
-            <a:off x="149374" y="4495006"/>
-            <a:ext cx="1270000" cy="381000"/>
-          </a:xfrm>
-          <a:prstGeom prst="rect">
-            <a:avLst/>
-          </a:prstGeom>
-          <a:solidFill>
-            <a:srgbClr val="D5F1CF"/>
-          </a:solidFill>
-          <a:ln w="25400" cap="flat">
-            <a:solidFill>
-              <a:schemeClr val="tx1"/>
-            </a:solidFill>
-            <a:prstDash val="solid"/>
-            <a:miter lim="800000"/>
-            <a:headEnd type="none" w="med" len="med"/>
-            <a:tailEnd type="none" w="med" len="med"/>
-          </a:ln>
-        </p:spPr>
-        <p:txBody>
-          <a:bodyPr lIns="38100" tIns="38100" rIns="38100" bIns="38100" anchor="ctr"/>
-          <a:lstStyle/>
-          <a:p>
-            <a:pPr algn="ctr"/>
-            <a:r>
-              <a:rPr lang="en-US" sz="2000">
-                <a:solidFill>
-                  <a:schemeClr val="tx1"/>
-                </a:solidFill>
-                <a:latin typeface="Courier New" pitchFamily="49" charset="0"/>
-                <a:cs typeface="Courier New" pitchFamily="49" charset="0"/>
-                <a:sym typeface="Courier New Bold" charset="0"/>
-              </a:rPr>
-              <a:t>i[0]</a:t>
-            </a:r>
-          </a:p>
-        </p:txBody>
-      </p:sp>
-      <p:sp>
-        <p:nvSpPr>
-          <p:cNvPr id="25609" name="Rectangle 9"/>
-          <p:cNvSpPr>
-            <a:spLocks/>
-          </p:cNvSpPr>
-          <p:nvPr/>
-        </p:nvSpPr>
-        <p:spPr bwMode="auto">
-          <a:xfrm>
-            <a:off x="1419374" y="4495006"/>
-            <a:ext cx="1270000" cy="381000"/>
-          </a:xfrm>
-          <a:prstGeom prst="rect">
-            <a:avLst/>
-          </a:prstGeom>
-          <a:solidFill>
-            <a:srgbClr val="D5F1CF"/>
-          </a:solidFill>
-          <a:ln w="25400" cap="flat">
-            <a:solidFill>
-              <a:schemeClr val="tx1"/>
-            </a:solidFill>
-            <a:prstDash val="solid"/>
-            <a:miter lim="800000"/>
-            <a:headEnd type="none" w="med" len="med"/>
-            <a:tailEnd type="none" w="med" len="med"/>
-          </a:ln>
-        </p:spPr>
-        <p:txBody>
-          <a:bodyPr lIns="38100" tIns="38100" rIns="38100" bIns="38100" anchor="ctr"/>
-          <a:lstStyle/>
-          <a:p>
-            <a:pPr algn="ctr"/>
-            <a:r>
-              <a:rPr lang="en-US" sz="2000">
-                <a:solidFill>
-                  <a:schemeClr val="tx1"/>
-                </a:solidFill>
-                <a:latin typeface="Courier New" pitchFamily="49" charset="0"/>
-                <a:cs typeface="Courier New" pitchFamily="49" charset="0"/>
-                <a:sym typeface="Courier New Bold" charset="0"/>
-              </a:rPr>
-              <a:t>i[1]</a:t>
-            </a:r>
-          </a:p>
-        </p:txBody>
-      </p:sp>
-      <p:sp>
-        <p:nvSpPr>
-          <p:cNvPr id="25610" name="Rectangle 10"/>
-          <p:cNvSpPr>
-            <a:spLocks/>
-          </p:cNvSpPr>
-          <p:nvPr/>
-        </p:nvSpPr>
-        <p:spPr bwMode="auto">
-          <a:xfrm>
-            <a:off x="3959374" y="4495006"/>
-            <a:ext cx="2540000" cy="381000"/>
-          </a:xfrm>
-          <a:prstGeom prst="rect">
-            <a:avLst/>
-          </a:prstGeom>
-          <a:solidFill>
-            <a:srgbClr val="D6D6F4"/>
-          </a:solidFill>
-          <a:ln w="25400" cap="flat">
-            <a:solidFill>
-              <a:schemeClr val="tx1"/>
-            </a:solidFill>
-            <a:prstDash val="solid"/>
-            <a:miter lim="800000"/>
-            <a:headEnd type="none" w="med" len="med"/>
-            <a:tailEnd type="none" w="med" len="med"/>
-          </a:ln>
-        </p:spPr>
-        <p:txBody>
-          <a:bodyPr lIns="38100" tIns="38100" rIns="38100" bIns="38100" anchor="ctr"/>
-          <a:lstStyle/>
-          <a:p>
-            <a:pPr algn="ctr"/>
-            <a:r>
-              <a:rPr lang="en-US" sz="2000" dirty="0">
-                <a:solidFill>
-                  <a:schemeClr val="tx1"/>
-                </a:solidFill>
-                <a:latin typeface="Courier New" pitchFamily="49" charset="0"/>
-                <a:cs typeface="Courier New" pitchFamily="49" charset="0"/>
-                <a:sym typeface="Courier New Bold" charset="0"/>
-              </a:rPr>
-              <a:t>v</a:t>
-            </a:r>
-          </a:p>
-        </p:txBody>
-      </p:sp>
-      <p:sp>
-        <p:nvSpPr>
-          <p:cNvPr id="25611" name="Rectangle 11"/>
-          <p:cNvSpPr>
-            <a:spLocks/>
-          </p:cNvSpPr>
-          <p:nvPr/>
-        </p:nvSpPr>
-        <p:spPr bwMode="auto">
-          <a:xfrm>
-            <a:off x="-803126" y="4495006"/>
-            <a:ext cx="952500" cy="381000"/>
-          </a:xfrm>
-          <a:prstGeom prst="rect">
-            <a:avLst/>
-          </a:prstGeom>
-          <a:solidFill>
-            <a:srgbClr val="B2B2B2"/>
-          </a:solidFill>
-          <a:ln w="25400" cap="flat">
-            <a:solidFill>
-              <a:schemeClr val="tx1"/>
-            </a:solidFill>
-            <a:prstDash val="solid"/>
-            <a:miter lim="800000"/>
-            <a:headEnd type="none" w="med" len="med"/>
-            <a:tailEnd type="none" w="med" len="med"/>
-          </a:ln>
-        </p:spPr>
-        <p:txBody>
-          <a:bodyPr lIns="38100" tIns="38100" rIns="38100" bIns="38100" anchor="ctr"/>
-          <a:lstStyle/>
-          <a:p>
-            <a:pPr algn="ctr"/>
-            <a:r>
-              <a:rPr lang="en-US" sz="1600">
-                <a:solidFill>
-                  <a:srgbClr val="FFFFFF"/>
-                </a:solidFill>
-                <a:latin typeface="Calibri Bold Italic" charset="0"/>
-                <a:ea typeface="Calibri Bold Italic" charset="0"/>
-                <a:cs typeface="Calibri Bold Italic" charset="0"/>
-                <a:sym typeface="Calibri Bold Italic" charset="0"/>
-              </a:rPr>
-              <a:t>3 bytes</a:t>
-            </a:r>
-          </a:p>
-        </p:txBody>
-      </p:sp>
-      <p:sp>
-        <p:nvSpPr>
-          <p:cNvPr id="25612" name="Rectangle 12"/>
-          <p:cNvSpPr>
-            <a:spLocks/>
-          </p:cNvSpPr>
-          <p:nvPr/>
-        </p:nvSpPr>
-        <p:spPr bwMode="auto">
-          <a:xfrm>
-            <a:off x="2689374" y="4495006"/>
-            <a:ext cx="1270000" cy="381000"/>
-          </a:xfrm>
-          <a:prstGeom prst="rect">
-            <a:avLst/>
-          </a:prstGeom>
-          <a:solidFill>
-            <a:srgbClr val="B2B2B2"/>
-          </a:solidFill>
-          <a:ln w="25400" cap="flat">
-            <a:solidFill>
-              <a:schemeClr val="tx1"/>
-            </a:solidFill>
-            <a:prstDash val="solid"/>
-            <a:miter lim="800000"/>
-            <a:headEnd type="none" w="med" len="med"/>
-            <a:tailEnd type="none" w="med" len="med"/>
-          </a:ln>
-        </p:spPr>
-        <p:txBody>
-          <a:bodyPr lIns="38100" tIns="38100" rIns="38100" bIns="38100" anchor="ctr"/>
-          <a:lstStyle/>
-          <a:p>
-            <a:pPr algn="ctr"/>
-            <a:r>
-              <a:rPr lang="en-US" sz="1600" dirty="0">
-                <a:solidFill>
-                  <a:srgbClr val="FFFFFF"/>
-                </a:solidFill>
-                <a:latin typeface="Calibri Bold Italic" charset="0"/>
-                <a:ea typeface="Calibri Bold Italic" charset="0"/>
-                <a:cs typeface="Calibri Bold Italic" charset="0"/>
-                <a:sym typeface="Calibri Bold Italic" charset="0"/>
-              </a:rPr>
-              <a:t>4 bytes</a:t>
-            </a:r>
-          </a:p>
-        </p:txBody>
-      </p:sp>
-      <p:sp>
-        <p:nvSpPr>
-          <p:cNvPr id="25613" name="Rectangle 13"/>
-          <p:cNvSpPr>
-            <a:spLocks/>
-          </p:cNvSpPr>
-          <p:nvPr/>
-        </p:nvSpPr>
-        <p:spPr bwMode="auto">
-          <a:xfrm>
-            <a:off x="-1373039" y="4888706"/>
-            <a:ext cx="490519" cy="353943"/>
+            <a:off x="8518787" y="4769592"/>
+            <a:ext cx="712857" cy="353943"/>
           </a:xfrm>
           <a:prstGeom prst="rect">
             <a:avLst/>
@@ -13495,7 +14189,7 @@
           </a:ln>
         </p:spPr>
         <p:txBody>
-          <a:bodyPr wrap="none" lIns="38100" tIns="38100" rIns="38100" bIns="38100">
+          <a:bodyPr wrap="square" lIns="38100" tIns="38100" rIns="38100" bIns="38100">
             <a:spAutoFit/>
           </a:bodyPr>
           <a:lstStyle/>
@@ -13509,14 +14203,36 @@
                 <a:cs typeface="Courier New" pitchFamily="49" charset="0"/>
                 <a:sym typeface="Courier New Bold" charset="0"/>
               </a:rPr>
-              <a:t>p+0</a:t>
-            </a:r>
+              <a:t>p+</a:t>
+            </a:r>
+            <a:r>
+              <a:rPr lang="en-US" sz="1800" dirty="0">
+                <a:latin typeface="Courier New" pitchFamily="49" charset="0"/>
+                <a:cs typeface="Courier New" pitchFamily="49" charset="0"/>
+                <a:sym typeface="Courier New Bold" charset="0"/>
+              </a:rPr>
+              <a:t>32</a:t>
+            </a:r>
+            <a:endParaRPr lang="en-US" sz="1800" dirty="0">
+              <a:solidFill>
+                <a:schemeClr val="tx1"/>
+              </a:solidFill>
+              <a:latin typeface="Courier New" pitchFamily="49" charset="0"/>
+              <a:cs typeface="Courier New" pitchFamily="49" charset="0"/>
+              <a:sym typeface="Courier New Bold" charset="0"/>
+            </a:endParaRPr>
           </a:p>
         </p:txBody>
       </p:sp>
       <p:sp>
         <p:nvSpPr>
-          <p:cNvPr id="25614" name="Rectangle 14"/>
+          <p:cNvPr id="4" name="Rectangle 24">
+            <a:extLst>
+              <a:ext uri="{FF2B5EF4-FFF2-40B4-BE49-F238E27FC236}">
+                <a16:creationId xmlns:a16="http://schemas.microsoft.com/office/drawing/2014/main" id="{A03C8A41-23DF-67EE-6F46-12D94A60741E}"/>
+              </a:ext>
+            </a:extLst>
+          </p:cNvPr>
           <p:cNvSpPr>
             <a:spLocks/>
           </p:cNvSpPr>
@@ -13524,14 +14240,14 @@
         </p:nvSpPr>
         <p:spPr bwMode="auto">
           <a:xfrm>
-            <a:off x="-101451" y="4888706"/>
-            <a:ext cx="490519" cy="353943"/>
+            <a:off x="7670584" y="5491583"/>
+            <a:ext cx="1374374" cy="312283"/>
           </a:xfrm>
           <a:prstGeom prst="rect">
             <a:avLst/>
           </a:prstGeom>
           <a:noFill/>
-          <a:ln w="25400" cap="flat">
+          <a:ln w="12700" cap="flat">
             <a:noFill/>
             <a:miter lim="800000"/>
             <a:headEnd type="none" w="med" len="med"/>
@@ -13539,160 +14255,38 @@
           </a:ln>
         </p:spPr>
         <p:txBody>
-          <a:bodyPr wrap="none" lIns="38100" tIns="38100" rIns="38100" bIns="38100">
-            <a:spAutoFit/>
-          </a:bodyPr>
+          <a:bodyPr lIns="38100" tIns="38100" rIns="38100" bIns="38100"/>
           <a:lstStyle/>
           <a:p>
-            <a:r>
-              <a:rPr lang="en-US" sz="1800">
+            <a:pPr marL="185738" indent="-185738">
+              <a:spcBef>
+                <a:spcPts val="638"/>
+              </a:spcBef>
+            </a:pPr>
+            <a:r>
+              <a:rPr lang="en-US" sz="1800" dirty="0">
                 <a:solidFill>
                   <a:schemeClr val="tx1"/>
                 </a:solidFill>
-                <a:latin typeface="Courier New" pitchFamily="49" charset="0"/>
-                <a:cs typeface="Courier New" pitchFamily="49" charset="0"/>
-                <a:sym typeface="Courier New Bold" charset="0"/>
-              </a:rPr>
-              <a:t>p+4</a:t>
+                <a:latin typeface="Calibri Bold" charset="0"/>
+                <a:ea typeface="Calibri Bold" charset="0"/>
+                <a:cs typeface="Calibri Bold" charset="0"/>
+                <a:sym typeface="Calibri Bold" charset="0"/>
+              </a:rPr>
+              <a:t>Multiple of 8</a:t>
             </a:r>
           </a:p>
         </p:txBody>
       </p:sp>
       <p:sp>
         <p:nvSpPr>
-          <p:cNvPr id="25615" name="Rectangle 15"/>
-          <p:cNvSpPr>
-            <a:spLocks/>
-          </p:cNvSpPr>
-          <p:nvPr/>
-        </p:nvSpPr>
-        <p:spPr bwMode="auto">
-          <a:xfrm>
-            <a:off x="1154261" y="4888706"/>
-            <a:ext cx="490519" cy="353943"/>
-          </a:xfrm>
-          <a:prstGeom prst="rect">
-            <a:avLst/>
-          </a:prstGeom>
-          <a:noFill/>
-          <a:ln w="25400" cap="flat">
-            <a:noFill/>
-            <a:miter lim="800000"/>
-            <a:headEnd type="none" w="med" len="med"/>
-            <a:tailEnd type="none" w="med" len="med"/>
-          </a:ln>
-        </p:spPr>
-        <p:txBody>
-          <a:bodyPr wrap="none" lIns="38100" tIns="38100" rIns="38100" bIns="38100">
-            <a:spAutoFit/>
-          </a:bodyPr>
-          <a:lstStyle/>
-          <a:p>
-            <a:r>
-              <a:rPr lang="en-US" sz="1800">
-                <a:solidFill>
-                  <a:schemeClr val="tx1"/>
-                </a:solidFill>
-                <a:latin typeface="Courier New" pitchFamily="49" charset="0"/>
-                <a:cs typeface="Courier New" pitchFamily="49" charset="0"/>
-                <a:sym typeface="Courier New Bold" charset="0"/>
-              </a:rPr>
-              <a:t>p+8</a:t>
-            </a:r>
-          </a:p>
-        </p:txBody>
-      </p:sp>
-      <p:sp>
-        <p:nvSpPr>
-          <p:cNvPr id="25616" name="Rectangle 16"/>
-          <p:cNvSpPr>
-            <a:spLocks/>
-          </p:cNvSpPr>
-          <p:nvPr/>
-        </p:nvSpPr>
-        <p:spPr bwMode="auto">
-          <a:xfrm>
-            <a:off x="3633936" y="4888706"/>
-            <a:ext cx="628377" cy="353943"/>
-          </a:xfrm>
-          <a:prstGeom prst="rect">
-            <a:avLst/>
-          </a:prstGeom>
-          <a:noFill/>
-          <a:ln w="25400" cap="flat">
-            <a:noFill/>
-            <a:miter lim="800000"/>
-            <a:headEnd type="none" w="med" len="med"/>
-            <a:tailEnd type="none" w="med" len="med"/>
-          </a:ln>
-        </p:spPr>
-        <p:txBody>
-          <a:bodyPr wrap="none" lIns="38100" tIns="38100" rIns="38100" bIns="38100">
-            <a:spAutoFit/>
-          </a:bodyPr>
-          <a:lstStyle/>
-          <a:p>
-            <a:r>
-              <a:rPr lang="en-US" sz="1800">
-                <a:solidFill>
-                  <a:schemeClr val="tx1"/>
-                </a:solidFill>
-                <a:latin typeface="Courier New" pitchFamily="49" charset="0"/>
-                <a:cs typeface="Courier New" pitchFamily="49" charset="0"/>
-                <a:sym typeface="Courier New Bold" charset="0"/>
-              </a:rPr>
-              <a:t>p+16</a:t>
-            </a:r>
-          </a:p>
-        </p:txBody>
-      </p:sp>
-      <p:sp>
-        <p:nvSpPr>
-          <p:cNvPr id="25617" name="Rectangle 17"/>
-          <p:cNvSpPr>
-            <a:spLocks/>
-          </p:cNvSpPr>
-          <p:nvPr/>
-        </p:nvSpPr>
-        <p:spPr bwMode="auto">
-          <a:xfrm>
-            <a:off x="6180286" y="4888706"/>
-            <a:ext cx="628377" cy="353943"/>
-          </a:xfrm>
-          <a:prstGeom prst="rect">
-            <a:avLst/>
-          </a:prstGeom>
-          <a:noFill/>
-          <a:ln w="25400" cap="flat">
-            <a:noFill/>
-            <a:miter lim="800000"/>
-            <a:headEnd type="none" w="med" len="med"/>
-            <a:tailEnd type="none" w="med" len="med"/>
-          </a:ln>
-        </p:spPr>
-        <p:txBody>
-          <a:bodyPr wrap="none" lIns="38100" tIns="38100" rIns="38100" bIns="38100">
-            <a:spAutoFit/>
-          </a:bodyPr>
-          <a:lstStyle/>
-          <a:p>
-            <a:r>
-              <a:rPr lang="en-US" sz="1800">
-                <a:solidFill>
-                  <a:schemeClr val="tx1"/>
-                </a:solidFill>
-                <a:latin typeface="Courier New" pitchFamily="49" charset="0"/>
-                <a:cs typeface="Courier New" pitchFamily="49" charset="0"/>
-                <a:sym typeface="Courier New Bold" charset="0"/>
-              </a:rPr>
-              <a:t>p+24</a:t>
-            </a:r>
-          </a:p>
-        </p:txBody>
-      </p:sp>
-      <p:sp>
-        <p:nvSpPr>
-          <p:cNvPr id="25618" name="Line 18"/>
+          <p:cNvPr id="5" name="Line 25">
+            <a:extLst>
+              <a:ext uri="{FF2B5EF4-FFF2-40B4-BE49-F238E27FC236}">
+                <a16:creationId xmlns:a16="http://schemas.microsoft.com/office/drawing/2014/main" id="{AD2BF3C7-177A-E6AF-0D23-5DB27CF46075}"/>
+              </a:ext>
+            </a:extLst>
+          </p:cNvPr>
           <p:cNvSpPr>
             <a:spLocks noChangeShapeType="1"/>
           </p:cNvSpPr>
@@ -13700,8 +14294,8 @@
         </p:nvSpPr>
         <p:spPr bwMode="auto">
           <a:xfrm rot="10800000" flipH="1">
-            <a:off x="149374" y="5237956"/>
-            <a:ext cx="0" cy="381000"/>
+            <a:off x="8785068" y="5076299"/>
+            <a:ext cx="1" cy="381825"/>
           </a:xfrm>
           <a:prstGeom prst="line">
             <a:avLst/>
@@ -13722,421 +14316,6 @@
           <a:lstStyle/>
           <a:p>
             <a:endParaRPr lang="en-US"/>
-          </a:p>
-        </p:txBody>
-      </p:sp>
-      <p:sp>
-        <p:nvSpPr>
-          <p:cNvPr id="25619" name="Rectangle 19"/>
-          <p:cNvSpPr>
-            <a:spLocks/>
-          </p:cNvSpPr>
-          <p:nvPr/>
-        </p:nvSpPr>
-        <p:spPr bwMode="auto">
-          <a:xfrm>
-            <a:off x="-371326" y="5571331"/>
-            <a:ext cx="2070100" cy="355600"/>
-          </a:xfrm>
-          <a:prstGeom prst="rect">
-            <a:avLst/>
-          </a:prstGeom>
-          <a:noFill/>
-          <a:ln w="12700" cap="flat">
-            <a:noFill/>
-            <a:miter lim="800000"/>
-            <a:headEnd type="none" w="med" len="med"/>
-            <a:tailEnd type="none" w="med" len="med"/>
-          </a:ln>
-        </p:spPr>
-        <p:txBody>
-          <a:bodyPr lIns="38100" tIns="38100" rIns="38100" bIns="38100"/>
-          <a:lstStyle/>
-          <a:p>
-            <a:pPr marL="185738" indent="-185738">
-              <a:spcBef>
-                <a:spcPts val="638"/>
-              </a:spcBef>
-            </a:pPr>
-            <a:r>
-              <a:rPr lang="en-US" sz="1800">
-                <a:solidFill>
-                  <a:schemeClr val="tx1"/>
-                </a:solidFill>
-                <a:latin typeface="Calibri Bold" charset="0"/>
-                <a:ea typeface="Calibri Bold" charset="0"/>
-                <a:cs typeface="Calibri Bold" charset="0"/>
-                <a:sym typeface="Calibri Bold" charset="0"/>
-              </a:rPr>
-              <a:t>Multiple of 4</a:t>
-            </a:r>
-          </a:p>
-        </p:txBody>
-      </p:sp>
-      <p:sp>
-        <p:nvSpPr>
-          <p:cNvPr id="25620" name="Rectangle 20"/>
-          <p:cNvSpPr>
-            <a:spLocks/>
-          </p:cNvSpPr>
-          <p:nvPr/>
-        </p:nvSpPr>
-        <p:spPr bwMode="auto">
-          <a:xfrm>
-            <a:off x="3044974" y="5571331"/>
-            <a:ext cx="1905000" cy="355600"/>
-          </a:xfrm>
-          <a:prstGeom prst="rect">
-            <a:avLst/>
-          </a:prstGeom>
-          <a:noFill/>
-          <a:ln w="12700" cap="flat">
-            <a:noFill/>
-            <a:miter lim="800000"/>
-            <a:headEnd type="none" w="med" len="med"/>
-            <a:tailEnd type="none" w="med" len="med"/>
-          </a:ln>
-        </p:spPr>
-        <p:txBody>
-          <a:bodyPr lIns="38100" tIns="38100" rIns="38100" bIns="38100"/>
-          <a:lstStyle/>
-          <a:p>
-            <a:pPr marL="185738" indent="-185738">
-              <a:spcBef>
-                <a:spcPts val="638"/>
-              </a:spcBef>
-            </a:pPr>
-            <a:r>
-              <a:rPr lang="en-US" sz="1800">
-                <a:solidFill>
-                  <a:schemeClr val="tx1"/>
-                </a:solidFill>
-                <a:latin typeface="Calibri Bold" charset="0"/>
-                <a:ea typeface="Calibri Bold" charset="0"/>
-                <a:cs typeface="Calibri Bold" charset="0"/>
-                <a:sym typeface="Calibri Bold" charset="0"/>
-              </a:rPr>
-              <a:t>Multiple of 8</a:t>
-            </a:r>
-          </a:p>
-        </p:txBody>
-      </p:sp>
-      <p:sp>
-        <p:nvSpPr>
-          <p:cNvPr id="25621" name="Line 21"/>
-          <p:cNvSpPr>
-            <a:spLocks noChangeShapeType="1"/>
-          </p:cNvSpPr>
-          <p:nvPr/>
-        </p:nvSpPr>
-        <p:spPr bwMode="auto">
-          <a:xfrm rot="10800000" flipH="1">
-            <a:off x="3959374" y="5237956"/>
-            <a:ext cx="0" cy="381000"/>
-          </a:xfrm>
-          <a:prstGeom prst="line">
-            <a:avLst/>
-          </a:prstGeom>
-          <a:noFill/>
-          <a:ln w="25400" cap="flat">
-            <a:solidFill>
-              <a:schemeClr val="tx1"/>
-            </a:solidFill>
-            <a:prstDash val="solid"/>
-            <a:round/>
-            <a:headEnd type="none" w="med" len="med"/>
-            <a:tailEnd type="triangle" w="med" len="med"/>
-          </a:ln>
-        </p:spPr>
-        <p:txBody>
-          <a:bodyPr lIns="0" tIns="0" rIns="0" bIns="0"/>
-          <a:lstStyle/>
-          <a:p>
-            <a:endParaRPr lang="en-US"/>
-          </a:p>
-        </p:txBody>
-      </p:sp>
-      <p:sp>
-        <p:nvSpPr>
-          <p:cNvPr id="25622" name="Rectangle 22"/>
-          <p:cNvSpPr>
-            <a:spLocks/>
-          </p:cNvSpPr>
-          <p:nvPr/>
-        </p:nvSpPr>
-        <p:spPr bwMode="auto">
-          <a:xfrm>
-            <a:off x="-1349226" y="6082506"/>
-            <a:ext cx="1536700" cy="355600"/>
-          </a:xfrm>
-          <a:prstGeom prst="rect">
-            <a:avLst/>
-          </a:prstGeom>
-          <a:noFill/>
-          <a:ln w="12700" cap="flat">
-            <a:noFill/>
-            <a:miter lim="800000"/>
-            <a:headEnd type="none" w="med" len="med"/>
-            <a:tailEnd type="none" w="med" len="med"/>
-          </a:ln>
-        </p:spPr>
-        <p:txBody>
-          <a:bodyPr lIns="38100" tIns="38100" rIns="38100" bIns="38100"/>
-          <a:lstStyle/>
-          <a:p>
-            <a:pPr marL="185738" indent="-185738">
-              <a:spcBef>
-                <a:spcPts val="638"/>
-              </a:spcBef>
-            </a:pPr>
-            <a:r>
-              <a:rPr lang="en-US" sz="1800">
-                <a:solidFill>
-                  <a:schemeClr val="tx1"/>
-                </a:solidFill>
-                <a:latin typeface="Calibri Bold" charset="0"/>
-                <a:ea typeface="Calibri Bold" charset="0"/>
-                <a:cs typeface="Calibri Bold" charset="0"/>
-                <a:sym typeface="Calibri Bold" charset="0"/>
-              </a:rPr>
-              <a:t>Multiple of 8</a:t>
-            </a:r>
-          </a:p>
-        </p:txBody>
-      </p:sp>
-      <p:sp>
-        <p:nvSpPr>
-          <p:cNvPr id="25623" name="Line 23"/>
-          <p:cNvSpPr>
-            <a:spLocks noChangeShapeType="1"/>
-          </p:cNvSpPr>
-          <p:nvPr/>
-        </p:nvSpPr>
-        <p:spPr bwMode="auto">
-          <a:xfrm rot="10800000" flipH="1">
-            <a:off x="-1120626" y="5237956"/>
-            <a:ext cx="0" cy="838200"/>
-          </a:xfrm>
-          <a:prstGeom prst="line">
-            <a:avLst/>
-          </a:prstGeom>
-          <a:noFill/>
-          <a:ln w="25400" cap="flat">
-            <a:solidFill>
-              <a:schemeClr val="tx1"/>
-            </a:solidFill>
-            <a:prstDash val="solid"/>
-            <a:round/>
-            <a:headEnd type="none" w="med" len="med"/>
-            <a:tailEnd type="triangle" w="med" len="med"/>
-          </a:ln>
-        </p:spPr>
-        <p:txBody>
-          <a:bodyPr lIns="0" tIns="0" rIns="0" bIns="0"/>
-          <a:lstStyle/>
-          <a:p>
-            <a:endParaRPr lang="en-US"/>
-          </a:p>
-        </p:txBody>
-      </p:sp>
-      <p:sp>
-        <p:nvSpPr>
-          <p:cNvPr id="25624" name="Rectangle 24"/>
-          <p:cNvSpPr>
-            <a:spLocks/>
-          </p:cNvSpPr>
-          <p:nvPr/>
-        </p:nvSpPr>
-        <p:spPr bwMode="auto">
-          <a:xfrm>
-            <a:off x="5191274" y="6082506"/>
-            <a:ext cx="1536700" cy="355600"/>
-          </a:xfrm>
-          <a:prstGeom prst="rect">
-            <a:avLst/>
-          </a:prstGeom>
-          <a:noFill/>
-          <a:ln w="12700" cap="flat">
-            <a:noFill/>
-            <a:miter lim="800000"/>
-            <a:headEnd type="none" w="med" len="med"/>
-            <a:tailEnd type="none" w="med" len="med"/>
-          </a:ln>
-        </p:spPr>
-        <p:txBody>
-          <a:bodyPr lIns="38100" tIns="38100" rIns="38100" bIns="38100"/>
-          <a:lstStyle/>
-          <a:p>
-            <a:pPr marL="185738" indent="-185738">
-              <a:spcBef>
-                <a:spcPts val="638"/>
-              </a:spcBef>
-            </a:pPr>
-            <a:r>
-              <a:rPr lang="en-US" sz="1800">
-                <a:solidFill>
-                  <a:schemeClr val="tx1"/>
-                </a:solidFill>
-                <a:latin typeface="Calibri Bold" charset="0"/>
-                <a:ea typeface="Calibri Bold" charset="0"/>
-                <a:cs typeface="Calibri Bold" charset="0"/>
-                <a:sym typeface="Calibri Bold" charset="0"/>
-              </a:rPr>
-              <a:t>Multiple of 8</a:t>
-            </a:r>
-          </a:p>
-        </p:txBody>
-      </p:sp>
-      <p:sp>
-        <p:nvSpPr>
-          <p:cNvPr id="25625" name="Line 25"/>
-          <p:cNvSpPr>
-            <a:spLocks noChangeShapeType="1"/>
-          </p:cNvSpPr>
-          <p:nvPr/>
-        </p:nvSpPr>
-        <p:spPr bwMode="auto">
-          <a:xfrm rot="10800000" flipH="1">
-            <a:off x="6499374" y="5237956"/>
-            <a:ext cx="0" cy="838200"/>
-          </a:xfrm>
-          <a:prstGeom prst="line">
-            <a:avLst/>
-          </a:prstGeom>
-          <a:noFill/>
-          <a:ln w="25400" cap="flat">
-            <a:solidFill>
-              <a:schemeClr val="tx1"/>
-            </a:solidFill>
-            <a:prstDash val="solid"/>
-            <a:round/>
-            <a:headEnd type="none" w="med" len="med"/>
-            <a:tailEnd type="triangle" w="med" len="med"/>
-          </a:ln>
-        </p:spPr>
-        <p:txBody>
-          <a:bodyPr lIns="0" tIns="0" rIns="0" bIns="0"/>
-          <a:lstStyle/>
-          <a:p>
-            <a:endParaRPr lang="en-US"/>
-          </a:p>
-        </p:txBody>
-      </p:sp>
-      <p:sp>
-        <p:nvSpPr>
-          <p:cNvPr id="24" name="Rectangle 10">
-            <a:extLst>
-              <a:ext uri="{FF2B5EF4-FFF2-40B4-BE49-F238E27FC236}">
-                <a16:creationId xmlns:a16="http://schemas.microsoft.com/office/drawing/2014/main" id="{759DEBB7-4F33-F141-B42A-388352185244}"/>
-              </a:ext>
-            </a:extLst>
-          </p:cNvPr>
-          <p:cNvSpPr>
-            <a:spLocks/>
-          </p:cNvSpPr>
-          <p:nvPr/>
-        </p:nvSpPr>
-        <p:spPr bwMode="auto">
-          <a:xfrm>
-            <a:off x="6520335" y="4487540"/>
-            <a:ext cx="1451484" cy="381000"/>
-          </a:xfrm>
-          <a:prstGeom prst="rect">
-            <a:avLst/>
-          </a:prstGeom>
-          <a:solidFill>
-            <a:srgbClr val="D6D6F4"/>
-          </a:solidFill>
-          <a:ln w="25400" cap="flat">
-            <a:solidFill>
-              <a:schemeClr val="tx1"/>
-            </a:solidFill>
-            <a:prstDash val="solid"/>
-            <a:miter lim="800000"/>
-            <a:headEnd type="none" w="med" len="med"/>
-            <a:tailEnd type="none" w="med" len="med"/>
-          </a:ln>
-        </p:spPr>
-        <p:txBody>
-          <a:bodyPr lIns="38100" tIns="38100" rIns="38100" bIns="38100" anchor="ctr"/>
-          <a:lstStyle/>
-          <a:p>
-            <a:pPr algn="ctr"/>
-            <a:r>
-              <a:rPr lang="en-US" sz="2000" dirty="0">
-                <a:latin typeface="Courier New" pitchFamily="49" charset="0"/>
-                <a:cs typeface="Courier New" pitchFamily="49" charset="0"/>
-                <a:sym typeface="Courier New Bold" charset="0"/>
-              </a:rPr>
-              <a:t>x</a:t>
-            </a:r>
-            <a:endParaRPr lang="en-US" sz="2000" dirty="0">
-              <a:solidFill>
-                <a:schemeClr val="tx1"/>
-              </a:solidFill>
-              <a:latin typeface="Courier New" pitchFamily="49" charset="0"/>
-              <a:cs typeface="Courier New" pitchFamily="49" charset="0"/>
-              <a:sym typeface="Courier New Bold" charset="0"/>
-            </a:endParaRPr>
-          </a:p>
-        </p:txBody>
-      </p:sp>
-      <p:sp>
-        <p:nvSpPr>
-          <p:cNvPr id="25" name="Rectangle 10">
-            <a:extLst>
-              <a:ext uri="{FF2B5EF4-FFF2-40B4-BE49-F238E27FC236}">
-                <a16:creationId xmlns:a16="http://schemas.microsoft.com/office/drawing/2014/main" id="{8AA7A0CB-B997-CF4F-BBD3-80EF7A99BC29}"/>
-              </a:ext>
-            </a:extLst>
-          </p:cNvPr>
-          <p:cNvSpPr>
-            <a:spLocks/>
-          </p:cNvSpPr>
-          <p:nvPr/>
-        </p:nvSpPr>
-        <p:spPr bwMode="auto">
-          <a:xfrm>
-            <a:off x="7992780" y="4487540"/>
-            <a:ext cx="1451484" cy="381000"/>
-          </a:xfrm>
-          <a:prstGeom prst="rect">
-            <a:avLst/>
-          </a:prstGeom>
-          <a:solidFill>
-            <a:srgbClr val="D6D6F4"/>
-          </a:solidFill>
-          <a:ln w="25400" cap="flat">
-            <a:solidFill>
-              <a:schemeClr val="tx1"/>
-            </a:solidFill>
-            <a:prstDash val="solid"/>
-            <a:miter lim="800000"/>
-            <a:headEnd type="none" w="med" len="med"/>
-            <a:tailEnd type="none" w="med" len="med"/>
-          </a:ln>
-        </p:spPr>
-        <p:txBody>
-          <a:bodyPr lIns="38100" tIns="38100" rIns="38100" bIns="38100" anchor="ctr"/>
-          <a:lstStyle/>
-          <a:p>
-            <a:pPr algn="ctr"/>
-            <a:r>
-              <a:rPr lang="en-US" sz="2000" dirty="0">
-                <a:latin typeface="Courier New" pitchFamily="49" charset="0"/>
-                <a:cs typeface="Courier New" pitchFamily="49" charset="0"/>
-                <a:sym typeface="Courier New Bold" charset="0"/>
-              </a:rPr>
-              <a:t>pad</a:t>
-            </a:r>
-            <a:endParaRPr lang="en-US" sz="2000" dirty="0">
-              <a:solidFill>
-                <a:schemeClr val="tx1"/>
-              </a:solidFill>
-              <a:latin typeface="Courier New" pitchFamily="49" charset="0"/>
-              <a:cs typeface="Courier New" pitchFamily="49" charset="0"/>
-              <a:sym typeface="Courier New Bold" charset="0"/>
-            </a:endParaRPr>
           </a:p>
         </p:txBody>
       </p:sp>

</xml_diff>